<commit_message>
fix logo issues, ref #7, #8
</commit_message>
<xml_diff>
--- a/docs/img/banner.pptx
+++ b/docs/img/banner.pptx
@@ -104,6 +104,22 @@
       </a:defRPr>
     </a:lvl9pPr>
   </p:defaultTextStyle>
+  <p:extLst>
+    <p:ext uri="{EFAFB233-063F-42B5-8137-9DF3F51BA10A}">
+      <p15:sldGuideLst xmlns:p15="http://schemas.microsoft.com/office/powerpoint/2012/main">
+        <p15:guide id="1" orient="horz" pos="2160" userDrawn="1">
+          <p15:clr>
+            <a:srgbClr val="A4A3A4"/>
+          </p15:clr>
+        </p15:guide>
+        <p15:guide id="2" pos="5496" userDrawn="1">
+          <p15:clr>
+            <a:srgbClr val="A4A3A4"/>
+          </p15:clr>
+        </p15:guide>
+      </p15:sldGuideLst>
+    </p:ext>
+  </p:extLst>
 </p:presentation>
 </file>
 
@@ -256,7 +272,7 @@
           <a:p>
             <a:fld id="{69C511A9-4CD4-7F4D-AE14-60F58D751B86}" type="datetimeFigureOut">
               <a:rPr lang="en-US" smtClean="0"/>
-              <a:t>9/14/21</a:t>
+              <a:t>9/19/2021</a:t>
             </a:fld>
             <a:endParaRPr lang="en-US"/>
           </a:p>
@@ -456,7 +472,7 @@
           <a:p>
             <a:fld id="{69C511A9-4CD4-7F4D-AE14-60F58D751B86}" type="datetimeFigureOut">
               <a:rPr lang="en-US" smtClean="0"/>
-              <a:t>9/14/21</a:t>
+              <a:t>9/19/2021</a:t>
             </a:fld>
             <a:endParaRPr lang="en-US"/>
           </a:p>
@@ -666,7 +682,7 @@
           <a:p>
             <a:fld id="{69C511A9-4CD4-7F4D-AE14-60F58D751B86}" type="datetimeFigureOut">
               <a:rPr lang="en-US" smtClean="0"/>
-              <a:t>9/14/21</a:t>
+              <a:t>9/19/2021</a:t>
             </a:fld>
             <a:endParaRPr lang="en-US"/>
           </a:p>
@@ -866,7 +882,7 @@
           <a:p>
             <a:fld id="{69C511A9-4CD4-7F4D-AE14-60F58D751B86}" type="datetimeFigureOut">
               <a:rPr lang="en-US" smtClean="0"/>
-              <a:t>9/14/21</a:t>
+              <a:t>9/19/2021</a:t>
             </a:fld>
             <a:endParaRPr lang="en-US"/>
           </a:p>
@@ -1142,7 +1158,7 @@
           <a:p>
             <a:fld id="{69C511A9-4CD4-7F4D-AE14-60F58D751B86}" type="datetimeFigureOut">
               <a:rPr lang="en-US" smtClean="0"/>
-              <a:t>9/14/21</a:t>
+              <a:t>9/19/2021</a:t>
             </a:fld>
             <a:endParaRPr lang="en-US"/>
           </a:p>
@@ -1410,7 +1426,7 @@
           <a:p>
             <a:fld id="{69C511A9-4CD4-7F4D-AE14-60F58D751B86}" type="datetimeFigureOut">
               <a:rPr lang="en-US" smtClean="0"/>
-              <a:t>9/14/21</a:t>
+              <a:t>9/19/2021</a:t>
             </a:fld>
             <a:endParaRPr lang="en-US"/>
           </a:p>
@@ -1825,7 +1841,7 @@
           <a:p>
             <a:fld id="{69C511A9-4CD4-7F4D-AE14-60F58D751B86}" type="datetimeFigureOut">
               <a:rPr lang="en-US" smtClean="0"/>
-              <a:t>9/14/21</a:t>
+              <a:t>9/19/2021</a:t>
             </a:fld>
             <a:endParaRPr lang="en-US"/>
           </a:p>
@@ -1967,7 +1983,7 @@
           <a:p>
             <a:fld id="{69C511A9-4CD4-7F4D-AE14-60F58D751B86}" type="datetimeFigureOut">
               <a:rPr lang="en-US" smtClean="0"/>
-              <a:t>9/14/21</a:t>
+              <a:t>9/19/2021</a:t>
             </a:fld>
             <a:endParaRPr lang="en-US"/>
           </a:p>
@@ -2080,7 +2096,7 @@
           <a:p>
             <a:fld id="{69C511A9-4CD4-7F4D-AE14-60F58D751B86}" type="datetimeFigureOut">
               <a:rPr lang="en-US" smtClean="0"/>
-              <a:t>9/14/21</a:t>
+              <a:t>9/19/2021</a:t>
             </a:fld>
             <a:endParaRPr lang="en-US"/>
           </a:p>
@@ -2393,7 +2409,7 @@
           <a:p>
             <a:fld id="{69C511A9-4CD4-7F4D-AE14-60F58D751B86}" type="datetimeFigureOut">
               <a:rPr lang="en-US" smtClean="0"/>
-              <a:t>9/14/21</a:t>
+              <a:t>9/19/2021</a:t>
             </a:fld>
             <a:endParaRPr lang="en-US"/>
           </a:p>
@@ -2682,7 +2698,7 @@
           <a:p>
             <a:fld id="{69C511A9-4CD4-7F4D-AE14-60F58D751B86}" type="datetimeFigureOut">
               <a:rPr lang="en-US" smtClean="0"/>
-              <a:t>9/14/21</a:t>
+              <a:t>9/19/2021</a:t>
             </a:fld>
             <a:endParaRPr lang="en-US"/>
           </a:p>
@@ -2925,7 +2941,7 @@
           <a:p>
             <a:fld id="{69C511A9-4CD4-7F4D-AE14-60F58D751B86}" type="datetimeFigureOut">
               <a:rPr lang="en-US" smtClean="0"/>
-              <a:t>9/14/21</a:t>
+              <a:t>9/19/2021</a:t>
             </a:fld>
             <a:endParaRPr lang="en-US"/>
           </a:p>
@@ -3856,8 +3872,8 @@
         </p:blipFill>
         <p:spPr>
           <a:xfrm>
-            <a:off x="-78059" y="3509819"/>
-            <a:ext cx="4348283" cy="3348180"/>
+            <a:off x="1186617" y="3593824"/>
+            <a:ext cx="2822605" cy="2173408"/>
           </a:xfrm>
           <a:prstGeom prst="rect">
             <a:avLst/>
@@ -4024,7 +4040,7 @@
         </p:blipFill>
         <p:spPr>
           <a:xfrm>
-            <a:off x="9676158" y="4269509"/>
+            <a:off x="8752897" y="4295318"/>
             <a:ext cx="914400" cy="914400"/>
           </a:xfrm>
           <a:prstGeom prst="rect">
@@ -4060,7 +4076,7 @@
         </p:blipFill>
         <p:spPr>
           <a:xfrm>
-            <a:off x="8722729" y="4282473"/>
+            <a:off x="7799468" y="4299046"/>
             <a:ext cx="914400" cy="914400"/>
           </a:xfrm>
           <a:prstGeom prst="rect">
@@ -4082,8 +4098,8 @@
         </p:nvSpPr>
         <p:spPr>
           <a:xfrm>
-            <a:off x="1670670" y="2971036"/>
-            <a:ext cx="10138416" cy="769441"/>
+            <a:off x="1377262" y="2986264"/>
+            <a:ext cx="9286581" cy="769441"/>
           </a:xfrm>
           <a:prstGeom prst="rect">
             <a:avLst/>
@@ -4097,14 +4113,10 @@
           <a:lstStyle/>
           <a:p>
             <a:r>
-              <a:rPr lang="en-AU" sz="4400" dirty="0">
-                <a:latin typeface="Glacial Indifference" pitchFamily="2" charset="0"/>
-              </a:rPr>
+              <a:rPr lang="en-AU" sz="4400" dirty="0"/>
               <a:t>Open-Source Statistical Software Award</a:t>
             </a:r>
-            <a:endParaRPr lang="en-US" sz="4400" dirty="0">
-              <a:latin typeface="Glacial Indifference" pitchFamily="2" charset="0"/>
-            </a:endParaRPr>
+            <a:endParaRPr lang="en-US" sz="4400" dirty="0"/>
           </a:p>
         </p:txBody>
       </p:sp>
@@ -4122,8 +4134,8 @@
         </p:nvSpPr>
         <p:spPr>
           <a:xfrm>
-            <a:off x="3817073" y="5755332"/>
-            <a:ext cx="4198585" cy="769441"/>
+            <a:off x="1388499" y="5543175"/>
+            <a:ext cx="2296811" cy="461665"/>
           </a:xfrm>
           <a:prstGeom prst="rect">
             <a:avLst/>
@@ -4131,20 +4143,16 @@
           <a:noFill/>
         </p:spPr>
         <p:txBody>
-          <a:bodyPr wrap="none" rtlCol="0">
+          <a:bodyPr wrap="square" rtlCol="0">
             <a:spAutoFit/>
           </a:bodyPr>
           <a:lstStyle/>
           <a:p>
             <a:r>
-              <a:rPr lang="en-AU" sz="4400" dirty="0">
-                <a:latin typeface="Glacial Indifference" pitchFamily="2" charset="0"/>
-              </a:rPr>
+              <a:rPr lang="en-AU" sz="2400" dirty="0"/>
               <a:t>Victorian Branch</a:t>
             </a:r>
-            <a:endParaRPr lang="en-US" sz="4400" dirty="0">
-              <a:latin typeface="Glacial Indifference" pitchFamily="2" charset="0"/>
-            </a:endParaRPr>
+            <a:endParaRPr lang="en-US" sz="2400" dirty="0"/>
           </a:p>
         </p:txBody>
       </p:sp>

</xml_diff>

<commit_message>
update banner to include Tasmanian Branch
</commit_message>
<xml_diff>
--- a/docs/img/banner.pptx
+++ b/docs/img/banner.pptx
@@ -272,7 +272,7 @@
           <a:p>
             <a:fld id="{69C511A9-4CD4-7F4D-AE14-60F58D751B86}" type="datetimeFigureOut">
               <a:rPr lang="en-US" smtClean="0"/>
-              <a:t>9/19/2021</a:t>
+              <a:t>9/12/23</a:t>
             </a:fld>
             <a:endParaRPr lang="en-US"/>
           </a:p>
@@ -472,7 +472,7 @@
           <a:p>
             <a:fld id="{69C511A9-4CD4-7F4D-AE14-60F58D751B86}" type="datetimeFigureOut">
               <a:rPr lang="en-US" smtClean="0"/>
-              <a:t>9/19/2021</a:t>
+              <a:t>9/12/23</a:t>
             </a:fld>
             <a:endParaRPr lang="en-US"/>
           </a:p>
@@ -682,7 +682,7 @@
           <a:p>
             <a:fld id="{69C511A9-4CD4-7F4D-AE14-60F58D751B86}" type="datetimeFigureOut">
               <a:rPr lang="en-US" smtClean="0"/>
-              <a:t>9/19/2021</a:t>
+              <a:t>9/12/23</a:t>
             </a:fld>
             <a:endParaRPr lang="en-US"/>
           </a:p>
@@ -882,7 +882,7 @@
           <a:p>
             <a:fld id="{69C511A9-4CD4-7F4D-AE14-60F58D751B86}" type="datetimeFigureOut">
               <a:rPr lang="en-US" smtClean="0"/>
-              <a:t>9/19/2021</a:t>
+              <a:t>9/12/23</a:t>
             </a:fld>
             <a:endParaRPr lang="en-US"/>
           </a:p>
@@ -1158,7 +1158,7 @@
           <a:p>
             <a:fld id="{69C511A9-4CD4-7F4D-AE14-60F58D751B86}" type="datetimeFigureOut">
               <a:rPr lang="en-US" smtClean="0"/>
-              <a:t>9/19/2021</a:t>
+              <a:t>9/12/23</a:t>
             </a:fld>
             <a:endParaRPr lang="en-US"/>
           </a:p>
@@ -1426,7 +1426,7 @@
           <a:p>
             <a:fld id="{69C511A9-4CD4-7F4D-AE14-60F58D751B86}" type="datetimeFigureOut">
               <a:rPr lang="en-US" smtClean="0"/>
-              <a:t>9/19/2021</a:t>
+              <a:t>9/12/23</a:t>
             </a:fld>
             <a:endParaRPr lang="en-US"/>
           </a:p>
@@ -1841,7 +1841,7 @@
           <a:p>
             <a:fld id="{69C511A9-4CD4-7F4D-AE14-60F58D751B86}" type="datetimeFigureOut">
               <a:rPr lang="en-US" smtClean="0"/>
-              <a:t>9/19/2021</a:t>
+              <a:t>9/12/23</a:t>
             </a:fld>
             <a:endParaRPr lang="en-US"/>
           </a:p>
@@ -1983,7 +1983,7 @@
           <a:p>
             <a:fld id="{69C511A9-4CD4-7F4D-AE14-60F58D751B86}" type="datetimeFigureOut">
               <a:rPr lang="en-US" smtClean="0"/>
-              <a:t>9/19/2021</a:t>
+              <a:t>9/12/23</a:t>
             </a:fld>
             <a:endParaRPr lang="en-US"/>
           </a:p>
@@ -2096,7 +2096,7 @@
           <a:p>
             <a:fld id="{69C511A9-4CD4-7F4D-AE14-60F58D751B86}" type="datetimeFigureOut">
               <a:rPr lang="en-US" smtClean="0"/>
-              <a:t>9/19/2021</a:t>
+              <a:t>9/12/23</a:t>
             </a:fld>
             <a:endParaRPr lang="en-US"/>
           </a:p>
@@ -2409,7 +2409,7 @@
           <a:p>
             <a:fld id="{69C511A9-4CD4-7F4D-AE14-60F58D751B86}" type="datetimeFigureOut">
               <a:rPr lang="en-US" smtClean="0"/>
-              <a:t>9/19/2021</a:t>
+              <a:t>9/12/23</a:t>
             </a:fld>
             <a:endParaRPr lang="en-US"/>
           </a:p>
@@ -2698,7 +2698,7 @@
           <a:p>
             <a:fld id="{69C511A9-4CD4-7F4D-AE14-60F58D751B86}" type="datetimeFigureOut">
               <a:rPr lang="en-US" smtClean="0"/>
-              <a:t>9/19/2021</a:t>
+              <a:t>9/12/23</a:t>
             </a:fld>
             <a:endParaRPr lang="en-US"/>
           </a:p>
@@ -2941,7 +2941,7 @@
           <a:p>
             <a:fld id="{69C511A9-4CD4-7F4D-AE14-60F58D751B86}" type="datetimeFigureOut">
               <a:rPr lang="en-US" smtClean="0"/>
-              <a:t>9/19/2021</a:t>
+              <a:t>9/12/23</a:t>
             </a:fld>
             <a:endParaRPr lang="en-US"/>
           </a:p>
@@ -4135,7 +4135,7 @@
         <p:spPr>
           <a:xfrm>
             <a:off x="1388499" y="5543175"/>
-            <a:ext cx="2296811" cy="461665"/>
+            <a:ext cx="4192494" cy="461665"/>
           </a:xfrm>
           <a:prstGeom prst="rect">
             <a:avLst/>
@@ -4150,7 +4150,7 @@
           <a:p>
             <a:r>
               <a:rPr lang="en-AU" sz="2400" dirty="0"/>
-              <a:t>Victorian Branch</a:t>
+              <a:t>Victorian &amp; Tasmanian Branch</a:t>
             </a:r>
             <a:endParaRPr lang="en-US" sz="2400" dirty="0"/>
           </a:p>

</xml_diff>